<commit_message>
breeder A, sea A, sea B, breeder B : update
</commit_message>
<xml_diff>
--- a/01_meeting_documents/hpai_mitagation_project_v2.pptx
+++ b/01_meeting_documents/hpai_mitagation_project_v2.pptx
@@ -19241,7 +19241,31 @@
           <a:p>
             <a:r>
               <a:rPr lang="fr-FR" dirty="0"/>
-              <a:t>In colonie 1:</a:t>
+              <a:t>In colonie 1, </a:t>
+            </a:r>
+            <a:r>
+              <a:rPr lang="en-US" dirty="0"/>
+              <a:t>infection rate of an individual of status </a:t>
+            </a:r>
+            <a:r>
+              <a:rPr lang="fr-FR" i="1" dirty="0"/>
+              <a:t>X</a:t>
+            </a:r>
+            <a:r>
+              <a:rPr lang="fr-FR" b="1" i="1" kern="100" baseline="-25000" dirty="0">
+                <a:latin typeface="Calibri" panose="020F0502020204030204" pitchFamily="34" charset="0"/>
+                <a:ea typeface="Calibri" panose="020F0502020204030204" pitchFamily="34" charset="0"/>
+                <a:cs typeface="Times New Roman" panose="02020603050405020304" pitchFamily="18" charset="0"/>
+              </a:rPr>
+              <a:t>C1,X</a:t>
+            </a:r>
+            <a:r>
+              <a:rPr lang="fr-FR" i="1" dirty="0"/>
+              <a:t> </a:t>
+            </a:r>
+            <a:r>
+              <a:rPr lang="fr-FR" dirty="0"/>
+              <a:t>:</a:t>
             </a:r>
           </a:p>
           <a:p>
@@ -19263,7 +19287,27 @@
             </a:r>
             <a:r>
               <a:rPr lang="fr-FR" dirty="0"/>
-              <a:t>.E</a:t>
+              <a:t>.</a:t>
+            </a:r>
+            <a:r>
+              <a:rPr lang="fr-FR" i="1" dirty="0"/>
+              <a:t>X</a:t>
+            </a:r>
+            <a:r>
+              <a:rPr lang="fr-FR" b="1" i="1" kern="100" baseline="-25000" dirty="0">
+                <a:latin typeface="Calibri" panose="020F0502020204030204" pitchFamily="34" charset="0"/>
+                <a:ea typeface="Calibri" panose="020F0502020204030204" pitchFamily="34" charset="0"/>
+                <a:cs typeface="Times New Roman" panose="02020603050405020304" pitchFamily="18" charset="0"/>
+              </a:rPr>
+              <a:t>C1,X</a:t>
+            </a:r>
+            <a:r>
+              <a:rPr lang="fr-FR" i="1" dirty="0"/>
+              <a:t> </a:t>
+            </a:r>
+            <a:r>
+              <a:rPr lang="fr-FR" dirty="0"/>
+              <a:t>. (E</a:t>
             </a:r>
             <a:r>
               <a:rPr lang="fr-FR" b="1" kern="100" baseline="-25000" dirty="0">
@@ -19275,8 +19319,38 @@
             </a:r>
             <a:r>
               <a:rPr lang="fr-FR" dirty="0"/>
-              <a:t> + </a:t>
-            </a:r>
+              <a:t> + E</a:t>
+            </a:r>
+            <a:r>
+              <a:rPr lang="fr-FR" b="1" kern="100" baseline="-25000" dirty="0">
+                <a:latin typeface="Calibri" panose="020F0502020204030204" pitchFamily="34" charset="0"/>
+                <a:ea typeface="Calibri" panose="020F0502020204030204" pitchFamily="34" charset="0"/>
+                <a:cs typeface="Times New Roman" panose="02020603050405020304" pitchFamily="18" charset="0"/>
+              </a:rPr>
+              <a:t>C1,N</a:t>
+            </a:r>
+            <a:r>
+              <a:rPr lang="fr-FR" dirty="0"/>
+              <a:t> + E</a:t>
+            </a:r>
+            <a:r>
+              <a:rPr lang="fr-FR" sz="2400" b="1" kern="100" baseline="-25000" dirty="0">
+                <a:effectLst/>
+                <a:latin typeface="Calibri" panose="020F0502020204030204" pitchFamily="34" charset="0"/>
+                <a:ea typeface="Calibri" panose="020F0502020204030204" pitchFamily="34" charset="0"/>
+                <a:cs typeface="Times New Roman" panose="02020603050405020304" pitchFamily="18" charset="0"/>
+              </a:rPr>
+              <a:t>C1,NB</a:t>
+            </a:r>
+            <a:r>
+              <a:rPr lang="fr-FR" dirty="0"/>
+              <a:t> )+ </a:t>
+            </a:r>
+          </a:p>
+          <a:p>
+            <a:pPr marL="457200" lvl="1" indent="0">
+              <a:buNone/>
+            </a:pPr>
             <a:r>
               <a:rPr lang="el-GR" dirty="0"/>
               <a:t>β</a:t>
@@ -19292,7 +19366,19 @@
             </a:r>
             <a:r>
               <a:rPr lang="fr-FR" dirty="0"/>
-              <a:t>.I</a:t>
+              <a:t>. X</a:t>
+            </a:r>
+            <a:r>
+              <a:rPr lang="fr-FR" b="1" kern="100" baseline="-25000" dirty="0">
+                <a:latin typeface="Calibri" panose="020F0502020204030204" pitchFamily="34" charset="0"/>
+                <a:ea typeface="Calibri" panose="020F0502020204030204" pitchFamily="34" charset="0"/>
+                <a:cs typeface="Times New Roman" panose="02020603050405020304" pitchFamily="18" charset="0"/>
+              </a:rPr>
+              <a:t>C1,X</a:t>
+            </a:r>
+            <a:r>
+              <a:rPr lang="fr-FR" dirty="0"/>
+              <a:t> .(I</a:t>
             </a:r>
             <a:r>
               <a:rPr lang="fr-FR" sz="2400" b="1" kern="100" baseline="-25000" dirty="0">
@@ -19301,15 +19387,80 @@
                 <a:ea typeface="Calibri" panose="020F0502020204030204" pitchFamily="34" charset="0"/>
                 <a:cs typeface="Times New Roman" panose="02020603050405020304" pitchFamily="18" charset="0"/>
               </a:rPr>
-              <a:t>C1,B</a:t>
+              <a:t>C1,B </a:t>
             </a:r>
             <a:r>
               <a:rPr lang="fr-FR" dirty="0"/>
-              <a:t> +</a:t>
-            </a:r>
+              <a:t>+I</a:t>
+            </a:r>
+            <a:r>
+              <a:rPr lang="fr-FR" b="1" kern="100" baseline="-25000" dirty="0">
+                <a:latin typeface="Calibri" panose="020F0502020204030204" pitchFamily="34" charset="0"/>
+                <a:ea typeface="Calibri" panose="020F0502020204030204" pitchFamily="34" charset="0"/>
+                <a:cs typeface="Times New Roman" panose="02020603050405020304" pitchFamily="18" charset="0"/>
+              </a:rPr>
+              <a:t>C1,N</a:t>
+            </a:r>
+            <a:r>
+              <a:rPr lang="fr-FR" dirty="0"/>
+              <a:t> +I</a:t>
+            </a:r>
+            <a:r>
+              <a:rPr lang="fr-FR" b="1" kern="100" baseline="-25000" dirty="0">
+                <a:latin typeface="Calibri" panose="020F0502020204030204" pitchFamily="34" charset="0"/>
+                <a:ea typeface="Calibri" panose="020F0502020204030204" pitchFamily="34" charset="0"/>
+                <a:cs typeface="Times New Roman" panose="02020603050405020304" pitchFamily="18" charset="0"/>
+              </a:rPr>
+              <a:t>C1,NB</a:t>
+            </a:r>
+            <a:r>
+              <a:rPr lang="fr-FR" dirty="0"/>
+              <a:t> )</a:t>
+            </a:r>
+          </a:p>
+          <a:p>
+            <a:pPr marL="457200" lvl="1" indent="0">
+              <a:buNone/>
+            </a:pPr>
+            <a:endParaRPr lang="en-US" dirty="0"/>
+          </a:p>
+          <a:p>
+            <a:r>
+              <a:rPr lang="fr-FR" dirty="0"/>
+              <a:t>In colonie 2, </a:t>
+            </a:r>
+            <a:r>
+              <a:rPr lang="en-US" dirty="0"/>
+              <a:t>infection rate of an individual of status </a:t>
+            </a:r>
+            <a:r>
+              <a:rPr lang="fr-FR" i="1" dirty="0"/>
+              <a:t>X</a:t>
+            </a:r>
+            <a:r>
+              <a:rPr lang="fr-FR" b="1" i="1" kern="100" baseline="-25000" dirty="0">
+                <a:latin typeface="Calibri" panose="020F0502020204030204" pitchFamily="34" charset="0"/>
+                <a:ea typeface="Calibri" panose="020F0502020204030204" pitchFamily="34" charset="0"/>
+                <a:cs typeface="Times New Roman" panose="02020603050405020304" pitchFamily="18" charset="0"/>
+              </a:rPr>
+              <a:t>C2,X</a:t>
+            </a:r>
+            <a:r>
+              <a:rPr lang="fr-FR" i="1" dirty="0"/>
+              <a:t> </a:t>
+            </a:r>
+            <a:r>
+              <a:rPr lang="fr-FR" dirty="0"/>
+              <a:t>:</a:t>
+            </a:r>
+          </a:p>
+          <a:p>
+            <a:pPr marL="457200" lvl="1" indent="0">
+              <a:buNone/>
+            </a:pPr>
             <a:r>
               <a:rPr lang="el-GR" dirty="0"/>
-              <a:t> β</a:t>
+              <a:t>β</a:t>
             </a:r>
             <a:r>
               <a:rPr lang="fr-FR" sz="2400" b="1" kern="100" baseline="-25000" dirty="0">
@@ -19322,7 +19473,27 @@
             </a:r>
             <a:r>
               <a:rPr lang="fr-FR" dirty="0"/>
-              <a:t>.E</a:t>
+              <a:t>.</a:t>
+            </a:r>
+            <a:r>
+              <a:rPr lang="fr-FR" i="1" dirty="0"/>
+              <a:t>X</a:t>
+            </a:r>
+            <a:r>
+              <a:rPr lang="fr-FR" b="1" i="1" kern="100" baseline="-25000" dirty="0">
+                <a:latin typeface="Calibri" panose="020F0502020204030204" pitchFamily="34" charset="0"/>
+                <a:ea typeface="Calibri" panose="020F0502020204030204" pitchFamily="34" charset="0"/>
+                <a:cs typeface="Times New Roman" panose="02020603050405020304" pitchFamily="18" charset="0"/>
+              </a:rPr>
+              <a:t>C2,X</a:t>
+            </a:r>
+            <a:r>
+              <a:rPr lang="fr-FR" i="1" dirty="0"/>
+              <a:t> </a:t>
+            </a:r>
+            <a:r>
+              <a:rPr lang="fr-FR" dirty="0"/>
+              <a:t>. (E</a:t>
             </a:r>
             <a:r>
               <a:rPr lang="fr-FR" b="1" kern="100" baseline="-25000" dirty="0">
@@ -19330,15 +19501,11 @@
                 <a:ea typeface="Calibri" panose="020F0502020204030204" pitchFamily="34" charset="0"/>
                 <a:cs typeface="Times New Roman" panose="02020603050405020304" pitchFamily="18" charset="0"/>
               </a:rPr>
-              <a:t>C1,N</a:t>
+              <a:t>C2,B</a:t>
             </a:r>
             <a:r>
               <a:rPr lang="fr-FR" dirty="0"/>
-              <a:t> +</a:t>
-            </a:r>
-            <a:r>
-              <a:rPr lang="el-GR" dirty="0"/>
-              <a:t> β</a:t>
+              <a:t> + E</a:t>
             </a:r>
             <a:r>
               <a:rPr lang="fr-FR" b="1" kern="100" baseline="-25000" dirty="0">
@@ -19346,27 +19513,11 @@
                 <a:ea typeface="Calibri" panose="020F0502020204030204" pitchFamily="34" charset="0"/>
                 <a:cs typeface="Times New Roman" panose="02020603050405020304" pitchFamily="18" charset="0"/>
               </a:rPr>
-              <a:t>I</a:t>
+              <a:t>C2,N</a:t>
             </a:r>
             <a:r>
               <a:rPr lang="fr-FR" dirty="0"/>
-              <a:t>.I</a:t>
-            </a:r>
-            <a:r>
-              <a:rPr lang="fr-FR" b="1" kern="100" baseline="-25000" dirty="0">
-                <a:latin typeface="Calibri" panose="020F0502020204030204" pitchFamily="34" charset="0"/>
-                <a:ea typeface="Calibri" panose="020F0502020204030204" pitchFamily="34" charset="0"/>
-                <a:cs typeface="Times New Roman" panose="02020603050405020304" pitchFamily="18" charset="0"/>
-              </a:rPr>
-              <a:t>C1,N</a:t>
-            </a:r>
-            <a:r>
-              <a:rPr lang="fr-FR" dirty="0"/>
-              <a:t> +</a:t>
-            </a:r>
-            <a:r>
-              <a:rPr lang="el-GR" dirty="0"/>
-              <a:t> β</a:t>
+              <a:t> + E</a:t>
             </a:r>
             <a:r>
               <a:rPr lang="fr-FR" sz="2400" b="1" kern="100" baseline="-25000" dirty="0">
@@ -19375,28 +19526,20 @@
                 <a:ea typeface="Calibri" panose="020F0502020204030204" pitchFamily="34" charset="0"/>
                 <a:cs typeface="Times New Roman" panose="02020603050405020304" pitchFamily="18" charset="0"/>
               </a:rPr>
-              <a:t>E</a:t>
+              <a:t>C2,NB</a:t>
             </a:r>
             <a:r>
               <a:rPr lang="fr-FR" dirty="0"/>
-              <a:t>.E</a:t>
-            </a:r>
-            <a:r>
-              <a:rPr lang="fr-FR" sz="2400" b="1" kern="100" baseline="-25000" dirty="0">
-                <a:effectLst/>
-                <a:latin typeface="Calibri" panose="020F0502020204030204" pitchFamily="34" charset="0"/>
-                <a:ea typeface="Calibri" panose="020F0502020204030204" pitchFamily="34" charset="0"/>
-                <a:cs typeface="Times New Roman" panose="02020603050405020304" pitchFamily="18" charset="0"/>
-              </a:rPr>
-              <a:t>C1,NB</a:t>
-            </a:r>
-            <a:r>
-              <a:rPr lang="fr-FR" dirty="0"/>
-              <a:t> +</a:t>
-            </a:r>
+              <a:t> )+ </a:t>
+            </a:r>
+          </a:p>
+          <a:p>
+            <a:pPr marL="457200" lvl="1" indent="0">
+              <a:buNone/>
+            </a:pPr>
             <a:r>
               <a:rPr lang="el-GR" dirty="0"/>
-              <a:t> β</a:t>
+              <a:t>β</a:t>
             </a:r>
             <a:r>
               <a:rPr lang="fr-FR" sz="2400" b="1" kern="100" baseline="-25000" dirty="0">
@@ -19409,7 +19552,19 @@
             </a:r>
             <a:r>
               <a:rPr lang="fr-FR" dirty="0"/>
-              <a:t>.I</a:t>
+              <a:t>. X</a:t>
+            </a:r>
+            <a:r>
+              <a:rPr lang="fr-FR" b="1" kern="100" baseline="-25000" dirty="0">
+                <a:latin typeface="Calibri" panose="020F0502020204030204" pitchFamily="34" charset="0"/>
+                <a:ea typeface="Calibri" panose="020F0502020204030204" pitchFamily="34" charset="0"/>
+                <a:cs typeface="Times New Roman" panose="02020603050405020304" pitchFamily="18" charset="0"/>
+              </a:rPr>
+              <a:t>C2,X</a:t>
+            </a:r>
+            <a:r>
+              <a:rPr lang="fr-FR" dirty="0"/>
+              <a:t> .(I</a:t>
             </a:r>
             <a:r>
               <a:rPr lang="fr-FR" sz="2400" b="1" kern="100" baseline="-25000" dirty="0">
@@ -19418,114 +19573,11 @@
                 <a:ea typeface="Calibri" panose="020F0502020204030204" pitchFamily="34" charset="0"/>
                 <a:cs typeface="Times New Roman" panose="02020603050405020304" pitchFamily="18" charset="0"/>
               </a:rPr>
-              <a:t>C1,NB</a:t>
+              <a:t>C2,B </a:t>
             </a:r>
             <a:r>
               <a:rPr lang="fr-FR" dirty="0"/>
-              <a:t> </a:t>
-            </a:r>
-            <a:endParaRPr lang="fr-FR" sz="2400" kern="100" dirty="0">
-              <a:effectLst/>
-              <a:latin typeface="Calibri" panose="020F0502020204030204" pitchFamily="34" charset="0"/>
-              <a:ea typeface="Calibri" panose="020F0502020204030204" pitchFamily="34" charset="0"/>
-              <a:cs typeface="Times New Roman" panose="02020603050405020304" pitchFamily="18" charset="0"/>
-            </a:endParaRPr>
-          </a:p>
-          <a:p>
-            <a:pPr marL="457200" lvl="1" indent="0">
-              <a:buNone/>
-            </a:pPr>
-            <a:endParaRPr lang="en-US" dirty="0"/>
-          </a:p>
-          <a:p>
-            <a:r>
-              <a:rPr lang="fr-FR" dirty="0"/>
-              <a:t>In colonie 2:</a:t>
-            </a:r>
-          </a:p>
-          <a:p>
-            <a:pPr marL="457200" lvl="1" indent="0">
-              <a:buNone/>
-            </a:pPr>
-            <a:r>
-              <a:rPr lang="el-GR" dirty="0"/>
-              <a:t>β</a:t>
-            </a:r>
-            <a:r>
-              <a:rPr lang="fr-FR" sz="2400" b="1" kern="100" baseline="-25000" dirty="0">
-                <a:effectLst/>
-                <a:latin typeface="Calibri" panose="020F0502020204030204" pitchFamily="34" charset="0"/>
-                <a:ea typeface="Calibri" panose="020F0502020204030204" pitchFamily="34" charset="0"/>
-                <a:cs typeface="Times New Roman" panose="02020603050405020304" pitchFamily="18" charset="0"/>
-              </a:rPr>
-              <a:t>E</a:t>
-            </a:r>
-            <a:r>
-              <a:rPr lang="fr-FR" dirty="0"/>
-              <a:t>.E</a:t>
-            </a:r>
-            <a:r>
-              <a:rPr lang="fr-FR" b="1" kern="100" baseline="-25000" dirty="0">
-                <a:latin typeface="Calibri" panose="020F0502020204030204" pitchFamily="34" charset="0"/>
-                <a:ea typeface="Calibri" panose="020F0502020204030204" pitchFamily="34" charset="0"/>
-                <a:cs typeface="Times New Roman" panose="02020603050405020304" pitchFamily="18" charset="0"/>
-              </a:rPr>
-              <a:t>C2,B</a:t>
-            </a:r>
-            <a:r>
-              <a:rPr lang="fr-FR" dirty="0"/>
-              <a:t> + </a:t>
-            </a:r>
-            <a:r>
-              <a:rPr lang="el-GR"/>
-              <a:t>β</a:t>
-            </a:r>
-            <a:r>
-              <a:rPr lang="fr-FR" sz="2400" b="1" kern="100" baseline="-25000">
-                <a:effectLst/>
-                <a:latin typeface="Calibri" panose="020F0502020204030204" pitchFamily="34" charset="0"/>
-                <a:ea typeface="Calibri" panose="020F0502020204030204" pitchFamily="34" charset="0"/>
-                <a:cs typeface="Times New Roman" panose="02020603050405020304" pitchFamily="18" charset="0"/>
-              </a:rPr>
-              <a:t>I</a:t>
-            </a:r>
-            <a:r>
-              <a:rPr lang="fr-FR"/>
-              <a:t>.</a:t>
-            </a:r>
-            <a:r>
-              <a:rPr lang="fr-FR" dirty="0"/>
-              <a:t>I</a:t>
-            </a:r>
-            <a:r>
-              <a:rPr lang="fr-FR" sz="2400" b="1" kern="100" baseline="-25000" dirty="0">
-                <a:effectLst/>
-                <a:latin typeface="Calibri" panose="020F0502020204030204" pitchFamily="34" charset="0"/>
-                <a:ea typeface="Calibri" panose="020F0502020204030204" pitchFamily="34" charset="0"/>
-                <a:cs typeface="Times New Roman" panose="02020603050405020304" pitchFamily="18" charset="0"/>
-              </a:rPr>
-              <a:t>C2,B</a:t>
-            </a:r>
-            <a:r>
-              <a:rPr lang="fr-FR" dirty="0"/>
-              <a:t> +</a:t>
-            </a:r>
-            <a:r>
-              <a:rPr lang="el-GR" dirty="0"/>
-              <a:t> β</a:t>
-            </a:r>
-            <a:r>
-              <a:rPr lang="fr-FR" sz="2400" b="1" kern="100" baseline="-25000" dirty="0">
-                <a:effectLst/>
-                <a:latin typeface="Calibri" panose="020F0502020204030204" pitchFamily="34" charset="0"/>
-                <a:ea typeface="Calibri" panose="020F0502020204030204" pitchFamily="34" charset="0"/>
-                <a:cs typeface="Times New Roman" panose="02020603050405020304" pitchFamily="18" charset="0"/>
-              </a:rPr>
-              <a:t>E</a:t>
-            </a:r>
-            <a:r>
-              <a:rPr lang="fr-FR" dirty="0"/>
-              <a:t>.E</a:t>
+              <a:t>+I</a:t>
             </a:r>
             <a:r>
               <a:rPr lang="fr-FR" b="1" kern="100" baseline="-25000" dirty="0">
@@ -19537,24 +19589,7 @@
             </a:r>
             <a:r>
               <a:rPr lang="fr-FR" dirty="0"/>
-              <a:t> +</a:t>
-            </a:r>
-            <a:r>
-              <a:rPr lang="el-GR" dirty="0"/>
-              <a:t> β</a:t>
-            </a:r>
-            <a:r>
-              <a:rPr lang="fr-FR" sz="2400" b="1" kern="100" baseline="-25000" dirty="0">
-                <a:effectLst/>
-                <a:latin typeface="Calibri" panose="020F0502020204030204" pitchFamily="34" charset="0"/>
-                <a:ea typeface="Calibri" panose="020F0502020204030204" pitchFamily="34" charset="0"/>
-                <a:cs typeface="Times New Roman" panose="02020603050405020304" pitchFamily="18" charset="0"/>
-              </a:rPr>
-              <a:t>I</a:t>
-            </a:r>
-            <a:r>
-              <a:rPr lang="fr-FR" dirty="0"/>
-              <a:t>.I</a:t>
+              <a:t> +I</a:t>
             </a:r>
             <a:r>
               <a:rPr lang="fr-FR" b="1" kern="100" baseline="-25000" dirty="0">
@@ -19562,78 +19597,12 @@
                 <a:ea typeface="Calibri" panose="020F0502020204030204" pitchFamily="34" charset="0"/>
                 <a:cs typeface="Times New Roman" panose="02020603050405020304" pitchFamily="18" charset="0"/>
               </a:rPr>
-              <a:t>C2,N</a:t>
+              <a:t>C2,NB</a:t>
             </a:r>
             <a:r>
               <a:rPr lang="fr-FR" dirty="0"/>
-              <a:t> +</a:t>
-            </a:r>
-            <a:r>
-              <a:rPr lang="el-GR" dirty="0"/>
-              <a:t> β</a:t>
-            </a:r>
-            <a:r>
-              <a:rPr lang="fr-FR" sz="2400" b="1" kern="100" baseline="-25000" dirty="0">
-                <a:effectLst/>
-                <a:latin typeface="Calibri" panose="020F0502020204030204" pitchFamily="34" charset="0"/>
-                <a:ea typeface="Calibri" panose="020F0502020204030204" pitchFamily="34" charset="0"/>
-                <a:cs typeface="Times New Roman" panose="02020603050405020304" pitchFamily="18" charset="0"/>
-              </a:rPr>
-              <a:t>E</a:t>
-            </a:r>
-            <a:r>
-              <a:rPr lang="fr-FR" dirty="0"/>
-              <a:t>.E</a:t>
-            </a:r>
-            <a:r>
-              <a:rPr lang="fr-FR" sz="2400" b="1" kern="100" baseline="-25000" dirty="0">
-                <a:effectLst/>
-                <a:latin typeface="Calibri" panose="020F0502020204030204" pitchFamily="34" charset="0"/>
-                <a:ea typeface="Calibri" panose="020F0502020204030204" pitchFamily="34" charset="0"/>
-                <a:cs typeface="Times New Roman" panose="02020603050405020304" pitchFamily="18" charset="0"/>
-              </a:rPr>
-              <a:t>C2,NB</a:t>
-            </a:r>
-            <a:r>
-              <a:rPr lang="fr-FR" dirty="0"/>
-              <a:t> +</a:t>
-            </a:r>
-            <a:r>
-              <a:rPr lang="el-GR" dirty="0"/>
-              <a:t> β</a:t>
-            </a:r>
-            <a:r>
-              <a:rPr lang="fr-FR" sz="2400" b="1" kern="100" baseline="-25000" dirty="0">
-                <a:effectLst/>
-                <a:latin typeface="Calibri" panose="020F0502020204030204" pitchFamily="34" charset="0"/>
-                <a:ea typeface="Calibri" panose="020F0502020204030204" pitchFamily="34" charset="0"/>
-                <a:cs typeface="Times New Roman" panose="02020603050405020304" pitchFamily="18" charset="0"/>
-              </a:rPr>
-              <a:t>I</a:t>
-            </a:r>
-            <a:r>
-              <a:rPr lang="fr-FR" dirty="0"/>
-              <a:t>.I</a:t>
-            </a:r>
-            <a:r>
-              <a:rPr lang="fr-FR" sz="2400" b="1" kern="100" baseline="-25000" dirty="0">
-                <a:effectLst/>
-                <a:latin typeface="Calibri" panose="020F0502020204030204" pitchFamily="34" charset="0"/>
-                <a:ea typeface="Calibri" panose="020F0502020204030204" pitchFamily="34" charset="0"/>
-                <a:cs typeface="Times New Roman" panose="02020603050405020304" pitchFamily="18" charset="0"/>
-              </a:rPr>
-              <a:t>C2,NB</a:t>
-            </a:r>
-            <a:r>
-              <a:rPr lang="fr-FR" dirty="0"/>
-              <a:t> </a:t>
-            </a:r>
-            <a:endParaRPr lang="fr-FR" sz="2400" kern="100" dirty="0">
-              <a:effectLst/>
-              <a:latin typeface="Calibri" panose="020F0502020204030204" pitchFamily="34" charset="0"/>
-              <a:ea typeface="Calibri" panose="020F0502020204030204" pitchFamily="34" charset="0"/>
-              <a:cs typeface="Times New Roman" panose="02020603050405020304" pitchFamily="18" charset="0"/>
-            </a:endParaRPr>
+              <a:t> )</a:t>
+            </a:r>
           </a:p>
           <a:p>
             <a:pPr marL="457200" lvl="1" indent="0">

</xml_diff>